<commit_message>
Added eventual consistency done right
</commit_message>
<xml_diff>
--- a/src/Database Indexes Made Simple/Presentation.pptx
+++ b/src/Database Indexes Made Simple/Presentation.pptx
@@ -218,7 +218,7 @@
           <a:p>
             <a:fld id="{0F9C471C-5CEB-41C5-B26F-30EBC0FE28CB}" type="datetimeFigureOut">
               <a:rPr lang="en-US" smtClean="0"/>
-              <a:t>7/28/2020</a:t>
+              <a:t>7/29/2020</a:t>
             </a:fld>
             <a:endParaRPr lang="en-US"/>
           </a:p>
@@ -670,7 +670,7 @@
           <a:noFill/>
           <a:extLst>
             <a:ext uri="{909E8E84-426E-40dd-AFC4-6F175D3DCCD1}">
-              <a14:hiddenFill xmlns="" xmlns:a14="http://schemas.microsoft.com/office/drawing/2010/main">
+              <a14:hiddenFill xmlns:a14="http://schemas.microsoft.com/office/drawing/2010/main" xmlns="">
                 <a:solidFill>
                   <a:srgbClr val="FFFFFF"/>
                 </a:solidFill>
@@ -730,7 +730,7 @@
             </a:ln>
             <a:extLst>
               <a:ext uri="{91240B29-F687-4f45-9708-019B960494DF}">
-                <a14:hiddenLine xmlns="" xmlns:a14="http://schemas.microsoft.com/office/drawing/2010/main" w="9525">
+                <a14:hiddenLine xmlns:a14="http://schemas.microsoft.com/office/drawing/2010/main" xmlns="" w="9525">
                   <a:solidFill>
                     <a:srgbClr val="000000"/>
                   </a:solidFill>
@@ -820,7 +820,7 @@
             </a:ln>
             <a:extLst>
               <a:ext uri="{91240B29-F687-4f45-9708-019B960494DF}">
-                <a14:hiddenLine xmlns="" xmlns:a14="http://schemas.microsoft.com/office/drawing/2010/main" w="9525">
+                <a14:hiddenLine xmlns:a14="http://schemas.microsoft.com/office/drawing/2010/main" xmlns="" w="9525">
                   <a:solidFill>
                     <a:srgbClr val="000000"/>
                   </a:solidFill>
@@ -910,7 +910,7 @@
             </a:ln>
             <a:extLst>
               <a:ext uri="{91240B29-F687-4f45-9708-019B960494DF}">
-                <a14:hiddenLine xmlns="" xmlns:a14="http://schemas.microsoft.com/office/drawing/2010/main" w="9525">
+                <a14:hiddenLine xmlns:a14="http://schemas.microsoft.com/office/drawing/2010/main" xmlns="" w="9525">
                   <a:solidFill>
                     <a:srgbClr val="000000"/>
                   </a:solidFill>
@@ -944,7 +944,7 @@
             </a:ln>
             <a:extLst>
               <a:ext uri="{91240B29-F687-4f45-9708-019B960494DF}">
-                <a14:hiddenLine xmlns="" xmlns:a14="http://schemas.microsoft.com/office/drawing/2010/main" w="9525">
+                <a14:hiddenLine xmlns:a14="http://schemas.microsoft.com/office/drawing/2010/main" xmlns="" w="9525">
                   <a:solidFill>
                     <a:srgbClr val="000000"/>
                   </a:solidFill>
@@ -1034,7 +1034,7 @@
             </a:ln>
             <a:extLst>
               <a:ext uri="{91240B29-F687-4f45-9708-019B960494DF}">
-                <a14:hiddenLine xmlns="" xmlns:a14="http://schemas.microsoft.com/office/drawing/2010/main" w="9525">
+                <a14:hiddenLine xmlns:a14="http://schemas.microsoft.com/office/drawing/2010/main" xmlns="" w="9525">
                   <a:solidFill>
                     <a:srgbClr val="000000"/>
                   </a:solidFill>
@@ -1096,7 +1096,7 @@
             </a:ln>
             <a:extLst>
               <a:ext uri="{91240B29-F687-4f45-9708-019B960494DF}">
-                <a14:hiddenLine xmlns="" xmlns:a14="http://schemas.microsoft.com/office/drawing/2010/main" w="9525">
+                <a14:hiddenLine xmlns:a14="http://schemas.microsoft.com/office/drawing/2010/main" xmlns="" w="9525">
                   <a:solidFill>
                     <a:srgbClr val="000000"/>
                   </a:solidFill>
@@ -1158,7 +1158,7 @@
             </a:ln>
             <a:extLst>
               <a:ext uri="{91240B29-F687-4f45-9708-019B960494DF}">
-                <a14:hiddenLine xmlns="" xmlns:a14="http://schemas.microsoft.com/office/drawing/2010/main" w="9525">
+                <a14:hiddenLine xmlns:a14="http://schemas.microsoft.com/office/drawing/2010/main" xmlns="" w="9525">
                   <a:solidFill>
                     <a:srgbClr val="000000"/>
                   </a:solidFill>
@@ -1248,7 +1248,7 @@
             </a:ln>
             <a:extLst>
               <a:ext uri="{91240B29-F687-4f45-9708-019B960494DF}">
-                <a14:hiddenLine xmlns="" xmlns:a14="http://schemas.microsoft.com/office/drawing/2010/main" w="9525">
+                <a14:hiddenLine xmlns:a14="http://schemas.microsoft.com/office/drawing/2010/main" xmlns="" w="9525">
                   <a:solidFill>
                     <a:srgbClr val="000000"/>
                   </a:solidFill>
@@ -1310,7 +1310,7 @@
             </a:ln>
             <a:extLst>
               <a:ext uri="{91240B29-F687-4f45-9708-019B960494DF}">
-                <a14:hiddenLine xmlns="" xmlns:a14="http://schemas.microsoft.com/office/drawing/2010/main" w="9525">
+                <a14:hiddenLine xmlns:a14="http://schemas.microsoft.com/office/drawing/2010/main" xmlns="" w="9525">
                   <a:solidFill>
                     <a:srgbClr val="000000"/>
                   </a:solidFill>
@@ -1372,7 +1372,7 @@
             </a:ln>
             <a:extLst>
               <a:ext uri="{91240B29-F687-4f45-9708-019B960494DF}">
-                <a14:hiddenLine xmlns="" xmlns:a14="http://schemas.microsoft.com/office/drawing/2010/main" w="9525">
+                <a14:hiddenLine xmlns:a14="http://schemas.microsoft.com/office/drawing/2010/main" xmlns="" w="9525">
                   <a:solidFill>
                     <a:srgbClr val="000000"/>
                   </a:solidFill>
@@ -1462,7 +1462,7 @@
             </a:ln>
             <a:extLst>
               <a:ext uri="{91240B29-F687-4f45-9708-019B960494DF}">
-                <a14:hiddenLine xmlns="" xmlns:a14="http://schemas.microsoft.com/office/drawing/2010/main" w="9525">
+                <a14:hiddenLine xmlns:a14="http://schemas.microsoft.com/office/drawing/2010/main" xmlns="" w="9525">
                   <a:solidFill>
                     <a:srgbClr val="000000"/>
                   </a:solidFill>
@@ -1552,7 +1552,7 @@
             </a:ln>
             <a:extLst>
               <a:ext uri="{91240B29-F687-4f45-9708-019B960494DF}">
-                <a14:hiddenLine xmlns="" xmlns:a14="http://schemas.microsoft.com/office/drawing/2010/main" w="9525">
+                <a14:hiddenLine xmlns:a14="http://schemas.microsoft.com/office/drawing/2010/main" xmlns="" w="9525">
                   <a:solidFill>
                     <a:srgbClr val="000000"/>
                   </a:solidFill>
@@ -1614,7 +1614,7 @@
             </a:ln>
             <a:extLst>
               <a:ext uri="{91240B29-F687-4f45-9708-019B960494DF}">
-                <a14:hiddenLine xmlns="" xmlns:a14="http://schemas.microsoft.com/office/drawing/2010/main" w="9525">
+                <a14:hiddenLine xmlns:a14="http://schemas.microsoft.com/office/drawing/2010/main" xmlns="" w="9525">
                   <a:solidFill>
                     <a:srgbClr val="000000"/>
                   </a:solidFill>
@@ -1724,7 +1724,7 @@
             </a:ln>
             <a:extLst>
               <a:ext uri="{91240B29-F687-4f45-9708-019B960494DF}">
-                <a14:hiddenLine xmlns="" xmlns:a14="http://schemas.microsoft.com/office/drawing/2010/main" w="9525">
+                <a14:hiddenLine xmlns:a14="http://schemas.microsoft.com/office/drawing/2010/main" xmlns="" w="9525">
                   <a:solidFill>
                     <a:srgbClr val="000000"/>
                   </a:solidFill>
@@ -1786,7 +1786,7 @@
             </a:ln>
             <a:extLst>
               <a:ext uri="{91240B29-F687-4f45-9708-019B960494DF}">
-                <a14:hiddenLine xmlns="" xmlns:a14="http://schemas.microsoft.com/office/drawing/2010/main" w="9525">
+                <a14:hiddenLine xmlns:a14="http://schemas.microsoft.com/office/drawing/2010/main" xmlns="" w="9525">
                   <a:solidFill>
                     <a:srgbClr val="000000"/>
                   </a:solidFill>
@@ -1876,7 +1876,7 @@
             </a:ln>
             <a:extLst>
               <a:ext uri="{91240B29-F687-4f45-9708-019B960494DF}">
-                <a14:hiddenLine xmlns="" xmlns:a14="http://schemas.microsoft.com/office/drawing/2010/main" w="9525">
+                <a14:hiddenLine xmlns:a14="http://schemas.microsoft.com/office/drawing/2010/main" xmlns="" w="9525">
                   <a:solidFill>
                     <a:srgbClr val="000000"/>
                   </a:solidFill>
@@ -1966,7 +1966,7 @@
             </a:ln>
             <a:extLst>
               <a:ext uri="{91240B29-F687-4f45-9708-019B960494DF}">
-                <a14:hiddenLine xmlns="" xmlns:a14="http://schemas.microsoft.com/office/drawing/2010/main" w="9525">
+                <a14:hiddenLine xmlns:a14="http://schemas.microsoft.com/office/drawing/2010/main" xmlns="" w="9525">
                   <a:solidFill>
                     <a:srgbClr val="000000"/>
                   </a:solidFill>
@@ -2028,7 +2028,7 @@
             </a:ln>
             <a:extLst>
               <a:ext uri="{91240B29-F687-4f45-9708-019B960494DF}">
-                <a14:hiddenLine xmlns="" xmlns:a14="http://schemas.microsoft.com/office/drawing/2010/main" w="9525">
+                <a14:hiddenLine xmlns:a14="http://schemas.microsoft.com/office/drawing/2010/main" xmlns="" w="9525">
                   <a:solidFill>
                     <a:srgbClr val="000000"/>
                   </a:solidFill>
@@ -2118,7 +2118,7 @@
             </a:ln>
             <a:extLst>
               <a:ext uri="{91240B29-F687-4f45-9708-019B960494DF}">
-                <a14:hiddenLine xmlns="" xmlns:a14="http://schemas.microsoft.com/office/drawing/2010/main" w="9525">
+                <a14:hiddenLine xmlns:a14="http://schemas.microsoft.com/office/drawing/2010/main" xmlns="" w="9525">
                   <a:solidFill>
                     <a:srgbClr val="000000"/>
                   </a:solidFill>
@@ -2208,7 +2208,7 @@
             </a:ln>
             <a:extLst>
               <a:ext uri="{91240B29-F687-4f45-9708-019B960494DF}">
-                <a14:hiddenLine xmlns="" xmlns:a14="http://schemas.microsoft.com/office/drawing/2010/main" w="9525">
+                <a14:hiddenLine xmlns:a14="http://schemas.microsoft.com/office/drawing/2010/main" xmlns="" w="9525">
                   <a:solidFill>
                     <a:srgbClr val="000000"/>
                   </a:solidFill>
@@ -2264,7 +2264,7 @@
             </a:ln>
             <a:extLst>
               <a:ext uri="{91240B29-F687-4f45-9708-019B960494DF}">
-                <a14:hiddenLine xmlns="" xmlns:a14="http://schemas.microsoft.com/office/drawing/2010/main" w="9525">
+                <a14:hiddenLine xmlns:a14="http://schemas.microsoft.com/office/drawing/2010/main" xmlns="" w="9525">
                   <a:solidFill>
                     <a:srgbClr val="000000"/>
                   </a:solidFill>
@@ -2354,7 +2354,7 @@
             </a:ln>
             <a:extLst>
               <a:ext uri="{91240B29-F687-4f45-9708-019B960494DF}">
-                <a14:hiddenLine xmlns="" xmlns:a14="http://schemas.microsoft.com/office/drawing/2010/main" w="9525">
+                <a14:hiddenLine xmlns:a14="http://schemas.microsoft.com/office/drawing/2010/main" xmlns="" w="9525">
                   <a:solidFill>
                     <a:srgbClr val="000000"/>
                   </a:solidFill>
@@ -2410,7 +2410,7 @@
             </a:ln>
             <a:extLst>
               <a:ext uri="{91240B29-F687-4f45-9708-019B960494DF}">
-                <a14:hiddenLine xmlns="" xmlns:a14="http://schemas.microsoft.com/office/drawing/2010/main" w="9525">
+                <a14:hiddenLine xmlns:a14="http://schemas.microsoft.com/office/drawing/2010/main" xmlns="" w="9525">
                   <a:solidFill>
                     <a:srgbClr val="000000"/>
                   </a:solidFill>
@@ -2500,7 +2500,7 @@
             </a:ln>
             <a:extLst>
               <a:ext uri="{91240B29-F687-4f45-9708-019B960494DF}">
-                <a14:hiddenLine xmlns="" xmlns:a14="http://schemas.microsoft.com/office/drawing/2010/main" w="9525">
+                <a14:hiddenLine xmlns:a14="http://schemas.microsoft.com/office/drawing/2010/main" xmlns="" w="9525">
                   <a:solidFill>
                     <a:srgbClr val="000000"/>
                   </a:solidFill>
@@ -2568,7 +2568,7 @@
             </a:ln>
             <a:extLst>
               <a:ext uri="{91240B29-F687-4f45-9708-019B960494DF}">
-                <a14:hiddenLine xmlns="" xmlns:a14="http://schemas.microsoft.com/office/drawing/2010/main" w="9525">
+                <a14:hiddenLine xmlns:a14="http://schemas.microsoft.com/office/drawing/2010/main" xmlns="" w="9525">
                   <a:solidFill>
                     <a:srgbClr val="000000"/>
                   </a:solidFill>
@@ -2658,7 +2658,7 @@
             </a:ln>
             <a:extLst>
               <a:ext uri="{91240B29-F687-4f45-9708-019B960494DF}">
-                <a14:hiddenLine xmlns="" xmlns:a14="http://schemas.microsoft.com/office/drawing/2010/main" w="9525">
+                <a14:hiddenLine xmlns:a14="http://schemas.microsoft.com/office/drawing/2010/main" xmlns="" w="9525">
                   <a:solidFill>
                     <a:srgbClr val="000000"/>
                   </a:solidFill>
@@ -2726,7 +2726,7 @@
             </a:ln>
             <a:extLst>
               <a:ext uri="{91240B29-F687-4f45-9708-019B960494DF}">
-                <a14:hiddenLine xmlns="" xmlns:a14="http://schemas.microsoft.com/office/drawing/2010/main" w="9525">
+                <a14:hiddenLine xmlns:a14="http://schemas.microsoft.com/office/drawing/2010/main" xmlns="" w="9525">
                   <a:solidFill>
                     <a:srgbClr val="000000"/>
                   </a:solidFill>
@@ -2816,7 +2816,7 @@
             </a:ln>
             <a:extLst>
               <a:ext uri="{91240B29-F687-4f45-9708-019B960494DF}">
-                <a14:hiddenLine xmlns="" xmlns:a14="http://schemas.microsoft.com/office/drawing/2010/main" w="9525">
+                <a14:hiddenLine xmlns:a14="http://schemas.microsoft.com/office/drawing/2010/main" xmlns="" w="9525">
                   <a:solidFill>
                     <a:srgbClr val="000000"/>
                   </a:solidFill>
@@ -2850,7 +2850,7 @@
             </a:ln>
             <a:extLst>
               <a:ext uri="{91240B29-F687-4f45-9708-019B960494DF}">
-                <a14:hiddenLine xmlns="" xmlns:a14="http://schemas.microsoft.com/office/drawing/2010/main" w="9525">
+                <a14:hiddenLine xmlns:a14="http://schemas.microsoft.com/office/drawing/2010/main" xmlns="" w="9525">
                   <a:solidFill>
                     <a:srgbClr val="000000"/>
                   </a:solidFill>
@@ -2940,7 +2940,7 @@
             </a:ln>
             <a:extLst>
               <a:ext uri="{91240B29-F687-4f45-9708-019B960494DF}">
-                <a14:hiddenLine xmlns="" xmlns:a14="http://schemas.microsoft.com/office/drawing/2010/main" w="9525">
+                <a14:hiddenLine xmlns:a14="http://schemas.microsoft.com/office/drawing/2010/main" xmlns="" w="9525">
                   <a:solidFill>
                     <a:srgbClr val="000000"/>
                   </a:solidFill>
@@ -3002,7 +3002,7 @@
             </a:ln>
             <a:extLst>
               <a:ext uri="{91240B29-F687-4f45-9708-019B960494DF}">
-                <a14:hiddenLine xmlns="" xmlns:a14="http://schemas.microsoft.com/office/drawing/2010/main" w="9525">
+                <a14:hiddenLine xmlns:a14="http://schemas.microsoft.com/office/drawing/2010/main" xmlns="" w="9525">
                   <a:solidFill>
                     <a:srgbClr val="000000"/>
                   </a:solidFill>
@@ -3064,7 +3064,7 @@
             </a:ln>
             <a:extLst>
               <a:ext uri="{91240B29-F687-4f45-9708-019B960494DF}">
-                <a14:hiddenLine xmlns="" xmlns:a14="http://schemas.microsoft.com/office/drawing/2010/main" w="9525">
+                <a14:hiddenLine xmlns:a14="http://schemas.microsoft.com/office/drawing/2010/main" xmlns="" w="9525">
                   <a:solidFill>
                     <a:srgbClr val="000000"/>
                   </a:solidFill>
@@ -3154,7 +3154,7 @@
             </a:ln>
             <a:extLst>
               <a:ext uri="{91240B29-F687-4f45-9708-019B960494DF}">
-                <a14:hiddenLine xmlns="" xmlns:a14="http://schemas.microsoft.com/office/drawing/2010/main" w="9525">
+                <a14:hiddenLine xmlns:a14="http://schemas.microsoft.com/office/drawing/2010/main" xmlns="" w="9525">
                   <a:solidFill>
                     <a:srgbClr val="000000"/>
                   </a:solidFill>
@@ -3222,7 +3222,7 @@
             </a:ln>
             <a:extLst>
               <a:ext uri="{91240B29-F687-4f45-9708-019B960494DF}">
-                <a14:hiddenLine xmlns="" xmlns:a14="http://schemas.microsoft.com/office/drawing/2010/main" w="9525">
+                <a14:hiddenLine xmlns:a14="http://schemas.microsoft.com/office/drawing/2010/main" xmlns="" w="9525">
                   <a:solidFill>
                     <a:srgbClr val="000000"/>
                   </a:solidFill>
@@ -3284,7 +3284,7 @@
             </a:ln>
             <a:extLst>
               <a:ext uri="{91240B29-F687-4f45-9708-019B960494DF}">
-                <a14:hiddenLine xmlns="" xmlns:a14="http://schemas.microsoft.com/office/drawing/2010/main" w="9525">
+                <a14:hiddenLine xmlns:a14="http://schemas.microsoft.com/office/drawing/2010/main" xmlns="" w="9525">
                   <a:solidFill>
                     <a:srgbClr val="000000"/>
                   </a:solidFill>
@@ -3374,7 +3374,7 @@
             </a:ln>
             <a:extLst>
               <a:ext uri="{91240B29-F687-4f45-9708-019B960494DF}">
-                <a14:hiddenLine xmlns="" xmlns:a14="http://schemas.microsoft.com/office/drawing/2010/main" w="9525">
+                <a14:hiddenLine xmlns:a14="http://schemas.microsoft.com/office/drawing/2010/main" xmlns="" w="9525">
                   <a:solidFill>
                     <a:srgbClr val="000000"/>
                   </a:solidFill>
@@ -3436,7 +3436,7 @@
             </a:ln>
             <a:extLst>
               <a:ext uri="{91240B29-F687-4f45-9708-019B960494DF}">
-                <a14:hiddenLine xmlns="" xmlns:a14="http://schemas.microsoft.com/office/drawing/2010/main" w="9525">
+                <a14:hiddenLine xmlns:a14="http://schemas.microsoft.com/office/drawing/2010/main" xmlns="" w="9525">
                   <a:solidFill>
                     <a:srgbClr val="000000"/>
                   </a:solidFill>
@@ -3526,7 +3526,7 @@
             </a:ln>
             <a:extLst>
               <a:ext uri="{91240B29-F687-4f45-9708-019B960494DF}">
-                <a14:hiddenLine xmlns="" xmlns:a14="http://schemas.microsoft.com/office/drawing/2010/main" w="9525">
+                <a14:hiddenLine xmlns:a14="http://schemas.microsoft.com/office/drawing/2010/main" xmlns="" w="9525">
                   <a:solidFill>
                     <a:srgbClr val="000000"/>
                   </a:solidFill>
@@ -3588,7 +3588,7 @@
             </a:ln>
             <a:extLst>
               <a:ext uri="{91240B29-F687-4f45-9708-019B960494DF}">
-                <a14:hiddenLine xmlns="" xmlns:a14="http://schemas.microsoft.com/office/drawing/2010/main" w="9525">
+                <a14:hiddenLine xmlns:a14="http://schemas.microsoft.com/office/drawing/2010/main" xmlns="" w="9525">
                   <a:solidFill>
                     <a:srgbClr val="000000"/>
                   </a:solidFill>
@@ -3678,7 +3678,7 @@
             </a:ln>
             <a:extLst>
               <a:ext uri="{91240B29-F687-4f45-9708-019B960494DF}">
-                <a14:hiddenLine xmlns="" xmlns:a14="http://schemas.microsoft.com/office/drawing/2010/main" w="9525">
+                <a14:hiddenLine xmlns:a14="http://schemas.microsoft.com/office/drawing/2010/main" xmlns="" w="9525">
                   <a:solidFill>
                     <a:srgbClr val="000000"/>
                   </a:solidFill>
@@ -3712,7 +3712,7 @@
             </a:ln>
             <a:extLst>
               <a:ext uri="{91240B29-F687-4f45-9708-019B960494DF}">
-                <a14:hiddenLine xmlns="" xmlns:a14="http://schemas.microsoft.com/office/drawing/2010/main" w="9525">
+                <a14:hiddenLine xmlns:a14="http://schemas.microsoft.com/office/drawing/2010/main" xmlns="" w="9525">
                   <a:solidFill>
                     <a:srgbClr val="000000"/>
                   </a:solidFill>
@@ -3777,7 +3777,7 @@
             </a:ln>
             <a:extLst>
               <a:ext uri="{91240B29-F687-4f45-9708-019B960494DF}">
-                <a14:hiddenLine xmlns="" xmlns:a14="http://schemas.microsoft.com/office/drawing/2010/main" w="9525">
+                <a14:hiddenLine xmlns:a14="http://schemas.microsoft.com/office/drawing/2010/main" xmlns="" w="9525">
                   <a:solidFill>
                     <a:srgbClr val="000000"/>
                   </a:solidFill>
@@ -3867,7 +3867,7 @@
             </a:ln>
             <a:extLst>
               <a:ext uri="{91240B29-F687-4f45-9708-019B960494DF}">
-                <a14:hiddenLine xmlns="" xmlns:a14="http://schemas.microsoft.com/office/drawing/2010/main" w="9525">
+                <a14:hiddenLine xmlns:a14="http://schemas.microsoft.com/office/drawing/2010/main" xmlns="" w="9525">
                   <a:solidFill>
                     <a:srgbClr val="000000"/>
                   </a:solidFill>
@@ -3929,7 +3929,7 @@
             </a:ln>
             <a:extLst>
               <a:ext uri="{91240B29-F687-4f45-9708-019B960494DF}">
-                <a14:hiddenLine xmlns="" xmlns:a14="http://schemas.microsoft.com/office/drawing/2010/main" w="9525">
+                <a14:hiddenLine xmlns:a14="http://schemas.microsoft.com/office/drawing/2010/main" xmlns="" w="9525">
                   <a:solidFill>
                     <a:srgbClr val="000000"/>
                   </a:solidFill>
@@ -4019,7 +4019,7 @@
             </a:ln>
             <a:extLst>
               <a:ext uri="{91240B29-F687-4f45-9708-019B960494DF}">
-                <a14:hiddenLine xmlns="" xmlns:a14="http://schemas.microsoft.com/office/drawing/2010/main" w="9525">
+                <a14:hiddenLine xmlns:a14="http://schemas.microsoft.com/office/drawing/2010/main" xmlns="" w="9525">
                   <a:solidFill>
                     <a:srgbClr val="000000"/>
                   </a:solidFill>
@@ -4109,7 +4109,7 @@
             </a:ln>
             <a:extLst>
               <a:ext uri="{91240B29-F687-4f45-9708-019B960494DF}">
-                <a14:hiddenLine xmlns="" xmlns:a14="http://schemas.microsoft.com/office/drawing/2010/main" w="9525">
+                <a14:hiddenLine xmlns:a14="http://schemas.microsoft.com/office/drawing/2010/main" xmlns="" w="9525">
                   <a:solidFill>
                     <a:srgbClr val="000000"/>
                   </a:solidFill>
@@ -4174,7 +4174,7 @@
             </a:ln>
             <a:extLst>
               <a:ext uri="{91240B29-F687-4f45-9708-019B960494DF}">
-                <a14:hiddenLine xmlns="" xmlns:a14="http://schemas.microsoft.com/office/drawing/2010/main" w="9525">
+                <a14:hiddenLine xmlns:a14="http://schemas.microsoft.com/office/drawing/2010/main" xmlns="" w="9525">
                   <a:solidFill>
                     <a:srgbClr val="000000"/>
                   </a:solidFill>
@@ -4236,7 +4236,7 @@
             </a:ln>
             <a:extLst>
               <a:ext uri="{91240B29-F687-4f45-9708-019B960494DF}">
-                <a14:hiddenLine xmlns="" xmlns:a14="http://schemas.microsoft.com/office/drawing/2010/main" w="9525">
+                <a14:hiddenLine xmlns:a14="http://schemas.microsoft.com/office/drawing/2010/main" xmlns="" w="9525">
                   <a:solidFill>
                     <a:srgbClr val="000000"/>
                   </a:solidFill>
@@ -4326,7 +4326,7 @@
             </a:ln>
             <a:extLst>
               <a:ext uri="{91240B29-F687-4f45-9708-019B960494DF}">
-                <a14:hiddenLine xmlns="" xmlns:a14="http://schemas.microsoft.com/office/drawing/2010/main" w="9525">
+                <a14:hiddenLine xmlns:a14="http://schemas.microsoft.com/office/drawing/2010/main" xmlns="" w="9525">
                   <a:solidFill>
                     <a:srgbClr val="000000"/>
                   </a:solidFill>
@@ -4416,7 +4416,7 @@
             </a:ln>
             <a:extLst>
               <a:ext uri="{91240B29-F687-4f45-9708-019B960494DF}">
-                <a14:hiddenLine xmlns="" xmlns:a14="http://schemas.microsoft.com/office/drawing/2010/main" w="9525">
+                <a14:hiddenLine xmlns:a14="http://schemas.microsoft.com/office/drawing/2010/main" xmlns="" w="9525">
                   <a:solidFill>
                     <a:srgbClr val="000000"/>
                   </a:solidFill>
@@ -4478,7 +4478,7 @@
             </a:ln>
             <a:extLst>
               <a:ext uri="{91240B29-F687-4f45-9708-019B960494DF}">
-                <a14:hiddenLine xmlns="" xmlns:a14="http://schemas.microsoft.com/office/drawing/2010/main" w="9525">
+                <a14:hiddenLine xmlns:a14="http://schemas.microsoft.com/office/drawing/2010/main" xmlns="" w="9525">
                   <a:solidFill>
                     <a:srgbClr val="000000"/>
                   </a:solidFill>
@@ -4598,7 +4598,7 @@
             </a:ln>
             <a:extLst>
               <a:ext uri="{91240B29-F687-4f45-9708-019B960494DF}">
-                <a14:hiddenLine xmlns="" xmlns:a14="http://schemas.microsoft.com/office/drawing/2010/main" w="9525">
+                <a14:hiddenLine xmlns:a14="http://schemas.microsoft.com/office/drawing/2010/main" xmlns="" w="9525">
                   <a:solidFill>
                     <a:srgbClr val="000000"/>
                   </a:solidFill>
@@ -4666,7 +4666,7 @@
             </a:ln>
             <a:extLst>
               <a:ext uri="{91240B29-F687-4f45-9708-019B960494DF}">
-                <a14:hiddenLine xmlns="" xmlns:a14="http://schemas.microsoft.com/office/drawing/2010/main" w="9525">
+                <a14:hiddenLine xmlns:a14="http://schemas.microsoft.com/office/drawing/2010/main" xmlns="" w="9525">
                   <a:solidFill>
                     <a:srgbClr val="000000"/>
                   </a:solidFill>
@@ -4756,7 +4756,7 @@
             </a:ln>
             <a:extLst>
               <a:ext uri="{91240B29-F687-4f45-9708-019B960494DF}">
-                <a14:hiddenLine xmlns="" xmlns:a14="http://schemas.microsoft.com/office/drawing/2010/main" w="9525">
+                <a14:hiddenLine xmlns:a14="http://schemas.microsoft.com/office/drawing/2010/main" xmlns="" w="9525">
                   <a:solidFill>
                     <a:srgbClr val="000000"/>
                   </a:solidFill>
@@ -4896,7 +4896,7 @@
           <a:p>
             <a:fld id="{F34B6E3E-06F4-4326-ABDB-61EE022A2F5F}" type="datetimeFigureOut">
               <a:rPr lang="en-US" smtClean="0"/>
-              <a:t>7/28/2020</a:t>
+              <a:t>7/29/2020</a:t>
             </a:fld>
             <a:endParaRPr lang="en-US"/>
           </a:p>
@@ -5163,7 +5163,7 @@
           <a:p>
             <a:fld id="{F34B6E3E-06F4-4326-ABDB-61EE022A2F5F}" type="datetimeFigureOut">
               <a:rPr lang="en-US" smtClean="0"/>
-              <a:t>7/28/2020</a:t>
+              <a:t>7/29/2020</a:t>
             </a:fld>
             <a:endParaRPr lang="en-US"/>
           </a:p>
@@ -5359,7 +5359,7 @@
           <a:p>
             <a:fld id="{F34B6E3E-06F4-4326-ABDB-61EE022A2F5F}" type="datetimeFigureOut">
               <a:rPr lang="en-US" smtClean="0"/>
-              <a:t>7/28/2020</a:t>
+              <a:t>7/29/2020</a:t>
             </a:fld>
             <a:endParaRPr lang="en-US"/>
           </a:p>
@@ -5622,7 +5622,7 @@
           <a:p>
             <a:fld id="{F34B6E3E-06F4-4326-ABDB-61EE022A2F5F}" type="datetimeFigureOut">
               <a:rPr lang="en-US" smtClean="0"/>
-              <a:t>7/28/2020</a:t>
+              <a:t>7/29/2020</a:t>
             </a:fld>
             <a:endParaRPr lang="en-US"/>
           </a:p>
@@ -6056,7 +6056,7 @@
           <a:p>
             <a:fld id="{F34B6E3E-06F4-4326-ABDB-61EE022A2F5F}" type="datetimeFigureOut">
               <a:rPr lang="en-US" smtClean="0"/>
-              <a:t>7/28/2020</a:t>
+              <a:t>7/29/2020</a:t>
             </a:fld>
             <a:endParaRPr lang="en-US"/>
           </a:p>
@@ -6602,7 +6602,7 @@
           <a:p>
             <a:fld id="{F34B6E3E-06F4-4326-ABDB-61EE022A2F5F}" type="datetimeFigureOut">
               <a:rPr lang="en-US" smtClean="0"/>
-              <a:t>7/28/2020</a:t>
+              <a:t>7/29/2020</a:t>
             </a:fld>
             <a:endParaRPr lang="en-US"/>
           </a:p>
@@ -7322,7 +7322,7 @@
           <a:p>
             <a:fld id="{F34B6E3E-06F4-4326-ABDB-61EE022A2F5F}" type="datetimeFigureOut">
               <a:rPr lang="en-US" smtClean="0"/>
-              <a:t>7/28/2020</a:t>
+              <a:t>7/29/2020</a:t>
             </a:fld>
             <a:endParaRPr lang="en-US"/>
           </a:p>
@@ -7492,7 +7492,7 @@
           <a:p>
             <a:fld id="{F34B6E3E-06F4-4326-ABDB-61EE022A2F5F}" type="datetimeFigureOut">
               <a:rPr lang="en-US" smtClean="0"/>
-              <a:t>7/28/2020</a:t>
+              <a:t>7/29/2020</a:t>
             </a:fld>
             <a:endParaRPr lang="en-US"/>
           </a:p>
@@ -7672,7 +7672,7 @@
           <a:p>
             <a:fld id="{F34B6E3E-06F4-4326-ABDB-61EE022A2F5F}" type="datetimeFigureOut">
               <a:rPr lang="en-US" smtClean="0"/>
-              <a:t>7/28/2020</a:t>
+              <a:t>7/29/2020</a:t>
             </a:fld>
             <a:endParaRPr lang="en-US"/>
           </a:p>
@@ -8340,7 +8340,7 @@
           <a:p>
             <a:fld id="{F34B6E3E-06F4-4326-ABDB-61EE022A2F5F}" type="datetimeFigureOut">
               <a:rPr lang="en-US" smtClean="0"/>
-              <a:t>7/28/2020</a:t>
+              <a:t>7/29/2020</a:t>
             </a:fld>
             <a:endParaRPr lang="en-US"/>
           </a:p>
@@ -8590,7 +8590,7 @@
           <a:p>
             <a:fld id="{F34B6E3E-06F4-4326-ABDB-61EE022A2F5F}" type="datetimeFigureOut">
               <a:rPr lang="en-US" smtClean="0"/>
-              <a:t>7/28/2020</a:t>
+              <a:t>7/29/2020</a:t>
             </a:fld>
             <a:endParaRPr lang="en-US"/>
           </a:p>
@@ -8822,7 +8822,7 @@
           <a:p>
             <a:fld id="{F34B6E3E-06F4-4326-ABDB-61EE022A2F5F}" type="datetimeFigureOut">
               <a:rPr lang="en-US" smtClean="0"/>
-              <a:t>7/28/2020</a:t>
+              <a:t>7/29/2020</a:t>
             </a:fld>
             <a:endParaRPr lang="en-US"/>
           </a:p>
@@ -9203,7 +9203,7 @@
           <a:p>
             <a:fld id="{F34B6E3E-06F4-4326-ABDB-61EE022A2F5F}" type="datetimeFigureOut">
               <a:rPr lang="en-US" smtClean="0"/>
-              <a:t>7/28/2020</a:t>
+              <a:t>7/29/2020</a:t>
             </a:fld>
             <a:endParaRPr lang="en-US"/>
           </a:p>
@@ -9321,7 +9321,7 @@
           <a:p>
             <a:fld id="{F34B6E3E-06F4-4326-ABDB-61EE022A2F5F}" type="datetimeFigureOut">
               <a:rPr lang="en-US" smtClean="0"/>
-              <a:t>7/28/2020</a:t>
+              <a:t>7/29/2020</a:t>
             </a:fld>
             <a:endParaRPr lang="en-US"/>
           </a:p>
@@ -9416,7 +9416,7 @@
           <a:p>
             <a:fld id="{F34B6E3E-06F4-4326-ABDB-61EE022A2F5F}" type="datetimeFigureOut">
               <a:rPr lang="en-US" smtClean="0"/>
-              <a:t>7/28/2020</a:t>
+              <a:t>7/29/2020</a:t>
             </a:fld>
             <a:endParaRPr lang="en-US"/>
           </a:p>
@@ -9665,7 +9665,7 @@
           <a:p>
             <a:fld id="{F34B6E3E-06F4-4326-ABDB-61EE022A2F5F}" type="datetimeFigureOut">
               <a:rPr lang="en-US" smtClean="0"/>
-              <a:t>7/28/2020</a:t>
+              <a:t>7/29/2020</a:t>
             </a:fld>
             <a:endParaRPr lang="en-US"/>
           </a:p>
@@ -9945,7 +9945,7 @@
           <a:p>
             <a:fld id="{F34B6E3E-06F4-4326-ABDB-61EE022A2F5F}" type="datetimeFigureOut">
               <a:rPr lang="en-US" smtClean="0"/>
-              <a:t>7/28/2020</a:t>
+              <a:t>7/29/2020</a:t>
             </a:fld>
             <a:endParaRPr lang="en-US"/>
           </a:p>
@@ -10061,7 +10061,7 @@
           <a:noFill/>
           <a:extLst>
             <a:ext uri="{909E8E84-426E-40dd-AFC4-6F175D3DCCD1}">
-              <a14:hiddenFill xmlns="" xmlns:a14="http://schemas.microsoft.com/office/drawing/2010/main">
+              <a14:hiddenFill xmlns:a14="http://schemas.microsoft.com/office/drawing/2010/main" xmlns="">
                 <a:solidFill>
                   <a:srgbClr val="FFFFFF"/>
                 </a:solidFill>
@@ -10135,7 +10135,7 @@
               </a:ln>
               <a:extLst>
                 <a:ext uri="{91240B29-F687-4f45-9708-019B960494DF}">
-                  <a14:hiddenLine xmlns="" xmlns:a14="http://schemas.microsoft.com/office/drawing/2010/main" w="9525">
+                  <a14:hiddenLine xmlns:a14="http://schemas.microsoft.com/office/drawing/2010/main" xmlns="" w="9525">
                     <a:solidFill>
                       <a:srgbClr val="000000"/>
                     </a:solidFill>
@@ -10225,7 +10225,7 @@
               </a:ln>
               <a:extLst>
                 <a:ext uri="{91240B29-F687-4f45-9708-019B960494DF}">
-                  <a14:hiddenLine xmlns="" xmlns:a14="http://schemas.microsoft.com/office/drawing/2010/main" w="9525">
+                  <a14:hiddenLine xmlns:a14="http://schemas.microsoft.com/office/drawing/2010/main" xmlns="" w="9525">
                     <a:solidFill>
                       <a:srgbClr val="000000"/>
                     </a:solidFill>
@@ -10315,7 +10315,7 @@
               </a:ln>
               <a:extLst>
                 <a:ext uri="{91240B29-F687-4f45-9708-019B960494DF}">
-                  <a14:hiddenLine xmlns="" xmlns:a14="http://schemas.microsoft.com/office/drawing/2010/main" w="9525">
+                  <a14:hiddenLine xmlns:a14="http://schemas.microsoft.com/office/drawing/2010/main" xmlns="" w="9525">
                     <a:solidFill>
                       <a:srgbClr val="000000"/>
                     </a:solidFill>
@@ -10377,7 +10377,7 @@
               </a:ln>
               <a:extLst>
                 <a:ext uri="{91240B29-F687-4f45-9708-019B960494DF}">
-                  <a14:hiddenLine xmlns="" xmlns:a14="http://schemas.microsoft.com/office/drawing/2010/main" w="9525">
+                  <a14:hiddenLine xmlns:a14="http://schemas.microsoft.com/office/drawing/2010/main" xmlns="" w="9525">
                     <a:solidFill>
                       <a:srgbClr val="000000"/>
                     </a:solidFill>
@@ -10467,7 +10467,7 @@
               </a:ln>
               <a:extLst>
                 <a:ext uri="{91240B29-F687-4f45-9708-019B960494DF}">
-                  <a14:hiddenLine xmlns="" xmlns:a14="http://schemas.microsoft.com/office/drawing/2010/main" w="9525">
+                  <a14:hiddenLine xmlns:a14="http://schemas.microsoft.com/office/drawing/2010/main" xmlns="" w="9525">
                     <a:solidFill>
                       <a:srgbClr val="000000"/>
                     </a:solidFill>
@@ -10529,7 +10529,7 @@
               </a:ln>
               <a:extLst>
                 <a:ext uri="{91240B29-F687-4f45-9708-019B960494DF}">
-                  <a14:hiddenLine xmlns="" xmlns:a14="http://schemas.microsoft.com/office/drawing/2010/main" w="9525">
+                  <a14:hiddenLine xmlns:a14="http://schemas.microsoft.com/office/drawing/2010/main" xmlns="" w="9525">
                     <a:solidFill>
                       <a:srgbClr val="000000"/>
                     </a:solidFill>
@@ -10591,7 +10591,7 @@
               </a:ln>
               <a:extLst>
                 <a:ext uri="{91240B29-F687-4f45-9708-019B960494DF}">
-                  <a14:hiddenLine xmlns="" xmlns:a14="http://schemas.microsoft.com/office/drawing/2010/main" w="9525">
+                  <a14:hiddenLine xmlns:a14="http://schemas.microsoft.com/office/drawing/2010/main" xmlns="" w="9525">
                     <a:solidFill>
                       <a:srgbClr val="000000"/>
                     </a:solidFill>
@@ -10681,7 +10681,7 @@
               </a:ln>
               <a:extLst>
                 <a:ext uri="{91240B29-F687-4f45-9708-019B960494DF}">
-                  <a14:hiddenLine xmlns="" xmlns:a14="http://schemas.microsoft.com/office/drawing/2010/main" w="9525">
+                  <a14:hiddenLine xmlns:a14="http://schemas.microsoft.com/office/drawing/2010/main" xmlns="" w="9525">
                     <a:solidFill>
                       <a:srgbClr val="000000"/>
                     </a:solidFill>
@@ -10771,7 +10771,7 @@
               </a:ln>
               <a:extLst>
                 <a:ext uri="{91240B29-F687-4f45-9708-019B960494DF}">
-                  <a14:hiddenLine xmlns="" xmlns:a14="http://schemas.microsoft.com/office/drawing/2010/main" w="9525">
+                  <a14:hiddenLine xmlns:a14="http://schemas.microsoft.com/office/drawing/2010/main" xmlns="" w="9525">
                     <a:solidFill>
                       <a:srgbClr val="000000"/>
                     </a:solidFill>
@@ -10833,7 +10833,7 @@
               </a:ln>
               <a:extLst>
                 <a:ext uri="{91240B29-F687-4f45-9708-019B960494DF}">
-                  <a14:hiddenLine xmlns="" xmlns:a14="http://schemas.microsoft.com/office/drawing/2010/main" w="9525">
+                  <a14:hiddenLine xmlns:a14="http://schemas.microsoft.com/office/drawing/2010/main" xmlns="" w="9525">
                     <a:solidFill>
                       <a:srgbClr val="000000"/>
                     </a:solidFill>
@@ -10943,7 +10943,7 @@
               </a:ln>
               <a:extLst>
                 <a:ext uri="{91240B29-F687-4f45-9708-019B960494DF}">
-                  <a14:hiddenLine xmlns="" xmlns:a14="http://schemas.microsoft.com/office/drawing/2010/main" w="9525">
+                  <a14:hiddenLine xmlns:a14="http://schemas.microsoft.com/office/drawing/2010/main" xmlns="" w="9525">
                     <a:solidFill>
                       <a:srgbClr val="000000"/>
                     </a:solidFill>
@@ -11027,7 +11027,7 @@
               </a:ln>
               <a:extLst>
                 <a:ext uri="{91240B29-F687-4f45-9708-019B960494DF}">
-                  <a14:hiddenLine xmlns="" xmlns:a14="http://schemas.microsoft.com/office/drawing/2010/main" w="9525">
+                  <a14:hiddenLine xmlns:a14="http://schemas.microsoft.com/office/drawing/2010/main" xmlns="" w="9525">
                     <a:solidFill>
                       <a:srgbClr val="000000"/>
                     </a:solidFill>
@@ -11089,7 +11089,7 @@
               </a:ln>
               <a:extLst>
                 <a:ext uri="{91240B29-F687-4f45-9708-019B960494DF}">
-                  <a14:hiddenLine xmlns="" xmlns:a14="http://schemas.microsoft.com/office/drawing/2010/main" w="9525">
+                  <a14:hiddenLine xmlns:a14="http://schemas.microsoft.com/office/drawing/2010/main" xmlns="" w="9525">
                     <a:solidFill>
                       <a:srgbClr val="000000"/>
                     </a:solidFill>
@@ -11151,7 +11151,7 @@
               </a:ln>
               <a:extLst>
                 <a:ext uri="{91240B29-F687-4f45-9708-019B960494DF}">
-                  <a14:hiddenLine xmlns="" xmlns:a14="http://schemas.microsoft.com/office/drawing/2010/main" w="9525">
+                  <a14:hiddenLine xmlns:a14="http://schemas.microsoft.com/office/drawing/2010/main" xmlns="" w="9525">
                     <a:solidFill>
                       <a:srgbClr val="000000"/>
                     </a:solidFill>
@@ -11241,7 +11241,7 @@
               </a:ln>
               <a:extLst>
                 <a:ext uri="{91240B29-F687-4f45-9708-019B960494DF}">
-                  <a14:hiddenLine xmlns="" xmlns:a14="http://schemas.microsoft.com/office/drawing/2010/main" w="9525">
+                  <a14:hiddenLine xmlns:a14="http://schemas.microsoft.com/office/drawing/2010/main" xmlns="" w="9525">
                     <a:solidFill>
                       <a:srgbClr val="000000"/>
                     </a:solidFill>
@@ -11275,7 +11275,7 @@
               </a:ln>
               <a:extLst>
                 <a:ext uri="{91240B29-F687-4f45-9708-019B960494DF}">
-                  <a14:hiddenLine xmlns="" xmlns:a14="http://schemas.microsoft.com/office/drawing/2010/main" w="9525">
+                  <a14:hiddenLine xmlns:a14="http://schemas.microsoft.com/office/drawing/2010/main" xmlns="" w="9525">
                     <a:solidFill>
                       <a:srgbClr val="000000"/>
                     </a:solidFill>
@@ -11340,7 +11340,7 @@
               </a:ln>
               <a:extLst>
                 <a:ext uri="{91240B29-F687-4f45-9708-019B960494DF}">
-                  <a14:hiddenLine xmlns="" xmlns:a14="http://schemas.microsoft.com/office/drawing/2010/main" w="9525">
+                  <a14:hiddenLine xmlns:a14="http://schemas.microsoft.com/office/drawing/2010/main" xmlns="" w="9525">
                     <a:solidFill>
                       <a:srgbClr val="000000"/>
                     </a:solidFill>
@@ -11430,7 +11430,7 @@
               </a:ln>
               <a:extLst>
                 <a:ext uri="{91240B29-F687-4f45-9708-019B960494DF}">
-                  <a14:hiddenLine xmlns="" xmlns:a14="http://schemas.microsoft.com/office/drawing/2010/main" w="9525">
+                  <a14:hiddenLine xmlns:a14="http://schemas.microsoft.com/office/drawing/2010/main" xmlns="" w="9525">
                     <a:solidFill>
                       <a:srgbClr val="000000"/>
                     </a:solidFill>
@@ -11492,7 +11492,7 @@
               </a:ln>
               <a:extLst>
                 <a:ext uri="{91240B29-F687-4f45-9708-019B960494DF}">
-                  <a14:hiddenLine xmlns="" xmlns:a14="http://schemas.microsoft.com/office/drawing/2010/main" w="9525">
+                  <a14:hiddenLine xmlns:a14="http://schemas.microsoft.com/office/drawing/2010/main" xmlns="" w="9525">
                     <a:solidFill>
                       <a:srgbClr val="000000"/>
                     </a:solidFill>
@@ -11582,7 +11582,7 @@
               </a:ln>
               <a:extLst>
                 <a:ext uri="{91240B29-F687-4f45-9708-019B960494DF}">
-                  <a14:hiddenLine xmlns="" xmlns:a14="http://schemas.microsoft.com/office/drawing/2010/main" w="9525">
+                  <a14:hiddenLine xmlns:a14="http://schemas.microsoft.com/office/drawing/2010/main" xmlns="" w="9525">
                     <a:solidFill>
                       <a:srgbClr val="000000"/>
                     </a:solidFill>
@@ -11647,7 +11647,7 @@
               </a:ln>
               <a:extLst>
                 <a:ext uri="{91240B29-F687-4f45-9708-019B960494DF}">
-                  <a14:hiddenLine xmlns="" xmlns:a14="http://schemas.microsoft.com/office/drawing/2010/main" w="9525">
+                  <a14:hiddenLine xmlns:a14="http://schemas.microsoft.com/office/drawing/2010/main" xmlns="" w="9525">
                     <a:solidFill>
                       <a:srgbClr val="000000"/>
                     </a:solidFill>
@@ -11709,7 +11709,7 @@
               </a:ln>
               <a:extLst>
                 <a:ext uri="{91240B29-F687-4f45-9708-019B960494DF}">
-                  <a14:hiddenLine xmlns="" xmlns:a14="http://schemas.microsoft.com/office/drawing/2010/main" w="9525">
+                  <a14:hiddenLine xmlns:a14="http://schemas.microsoft.com/office/drawing/2010/main" xmlns="" w="9525">
                     <a:solidFill>
                       <a:srgbClr val="000000"/>
                     </a:solidFill>
@@ -11799,7 +11799,7 @@
               </a:ln>
               <a:extLst>
                 <a:ext uri="{91240B29-F687-4f45-9708-019B960494DF}">
-                  <a14:hiddenLine xmlns="" xmlns:a14="http://schemas.microsoft.com/office/drawing/2010/main" w="9525">
+                  <a14:hiddenLine xmlns:a14="http://schemas.microsoft.com/office/drawing/2010/main" xmlns="" w="9525">
                     <a:solidFill>
                       <a:srgbClr val="000000"/>
                     </a:solidFill>
@@ -11889,7 +11889,7 @@
               </a:ln>
               <a:extLst>
                 <a:ext uri="{91240B29-F687-4f45-9708-019B960494DF}">
-                  <a14:hiddenLine xmlns="" xmlns:a14="http://schemas.microsoft.com/office/drawing/2010/main" w="9525">
+                  <a14:hiddenLine xmlns:a14="http://schemas.microsoft.com/office/drawing/2010/main" xmlns="" w="9525">
                     <a:solidFill>
                       <a:srgbClr val="000000"/>
                     </a:solidFill>
@@ -11954,7 +11954,7 @@
               </a:ln>
               <a:extLst>
                 <a:ext uri="{91240B29-F687-4f45-9708-019B960494DF}">
-                  <a14:hiddenLine xmlns="" xmlns:a14="http://schemas.microsoft.com/office/drawing/2010/main" w="9525">
+                  <a14:hiddenLine xmlns:a14="http://schemas.microsoft.com/office/drawing/2010/main" xmlns="" w="9525">
                     <a:solidFill>
                       <a:srgbClr val="000000"/>
                     </a:solidFill>
@@ -12074,7 +12074,7 @@
               </a:ln>
               <a:extLst>
                 <a:ext uri="{91240B29-F687-4f45-9708-019B960494DF}">
-                  <a14:hiddenLine xmlns="" xmlns:a14="http://schemas.microsoft.com/office/drawing/2010/main" w="9525">
+                  <a14:hiddenLine xmlns:a14="http://schemas.microsoft.com/office/drawing/2010/main" xmlns="" w="9525">
                     <a:solidFill>
                       <a:srgbClr val="000000"/>
                     </a:solidFill>
@@ -12172,7 +12172,7 @@
               </a:ln>
               <a:extLst>
                 <a:ext uri="{91240B29-F687-4f45-9708-019B960494DF}">
-                  <a14:hiddenLine xmlns="" xmlns:a14="http://schemas.microsoft.com/office/drawing/2010/main" w="9525">
+                  <a14:hiddenLine xmlns:a14="http://schemas.microsoft.com/office/drawing/2010/main" xmlns="" w="9525">
                     <a:solidFill>
                       <a:srgbClr val="000000"/>
                     </a:solidFill>
@@ -12287,7 +12287,7 @@
               </a:ln>
               <a:extLst>
                 <a:ext uri="{91240B29-F687-4f45-9708-019B960494DF}">
-                  <a14:hiddenLine xmlns="" xmlns:a14="http://schemas.microsoft.com/office/drawing/2010/main" w="9525">
+                  <a14:hiddenLine xmlns:a14="http://schemas.microsoft.com/office/drawing/2010/main" xmlns="" w="9525">
                     <a:solidFill>
                       <a:srgbClr val="000000"/>
                     </a:solidFill>
@@ -12377,7 +12377,7 @@
               </a:ln>
               <a:extLst>
                 <a:ext uri="{91240B29-F687-4f45-9708-019B960494DF}">
-                  <a14:hiddenLine xmlns="" xmlns:a14="http://schemas.microsoft.com/office/drawing/2010/main" w="9525">
+                  <a14:hiddenLine xmlns:a14="http://schemas.microsoft.com/office/drawing/2010/main" xmlns="" w="9525">
                     <a:solidFill>
                       <a:srgbClr val="000000"/>
                     </a:solidFill>
@@ -12442,7 +12442,7 @@
               </a:ln>
               <a:extLst>
                 <a:ext uri="{91240B29-F687-4f45-9708-019B960494DF}">
-                  <a14:hiddenLine xmlns="" xmlns:a14="http://schemas.microsoft.com/office/drawing/2010/main" w="9525">
+                  <a14:hiddenLine xmlns:a14="http://schemas.microsoft.com/office/drawing/2010/main" xmlns="" w="9525">
                     <a:solidFill>
                       <a:srgbClr val="000000"/>
                     </a:solidFill>
@@ -12532,7 +12532,7 @@
               </a:ln>
               <a:extLst>
                 <a:ext uri="{91240B29-F687-4f45-9708-019B960494DF}">
-                  <a14:hiddenLine xmlns="" xmlns:a14="http://schemas.microsoft.com/office/drawing/2010/main" w="9525">
+                  <a14:hiddenLine xmlns:a14="http://schemas.microsoft.com/office/drawing/2010/main" xmlns="" w="9525">
                     <a:solidFill>
                       <a:srgbClr val="000000"/>
                     </a:solidFill>
@@ -12600,7 +12600,7 @@
               </a:ln>
               <a:extLst>
                 <a:ext uri="{91240B29-F687-4f45-9708-019B960494DF}">
-                  <a14:hiddenLine xmlns="" xmlns:a14="http://schemas.microsoft.com/office/drawing/2010/main" w="9525">
+                  <a14:hiddenLine xmlns:a14="http://schemas.microsoft.com/office/drawing/2010/main" xmlns="" w="9525">
                     <a:solidFill>
                       <a:srgbClr val="000000"/>
                     </a:solidFill>
@@ -12690,7 +12690,7 @@
               </a:ln>
               <a:extLst>
                 <a:ext uri="{91240B29-F687-4f45-9708-019B960494DF}">
-                  <a14:hiddenLine xmlns="" xmlns:a14="http://schemas.microsoft.com/office/drawing/2010/main" w="9525">
+                  <a14:hiddenLine xmlns:a14="http://schemas.microsoft.com/office/drawing/2010/main" xmlns="" w="9525">
                     <a:solidFill>
                       <a:srgbClr val="000000"/>
                     </a:solidFill>
@@ -12758,7 +12758,7 @@
               </a:ln>
               <a:extLst>
                 <a:ext uri="{91240B29-F687-4f45-9708-019B960494DF}">
-                  <a14:hiddenLine xmlns="" xmlns:a14="http://schemas.microsoft.com/office/drawing/2010/main" w="9525">
+                  <a14:hiddenLine xmlns:a14="http://schemas.microsoft.com/office/drawing/2010/main" xmlns="" w="9525">
                     <a:solidFill>
                       <a:srgbClr val="000000"/>
                     </a:solidFill>
@@ -12848,7 +12848,7 @@
               </a:ln>
               <a:extLst>
                 <a:ext uri="{91240B29-F687-4f45-9708-019B960494DF}">
-                  <a14:hiddenLine xmlns="" xmlns:a14="http://schemas.microsoft.com/office/drawing/2010/main" w="9525">
+                  <a14:hiddenLine xmlns:a14="http://schemas.microsoft.com/office/drawing/2010/main" xmlns="" w="9525">
                     <a:solidFill>
                       <a:srgbClr val="000000"/>
                     </a:solidFill>
@@ -12882,7 +12882,7 @@
               </a:ln>
               <a:extLst>
                 <a:ext uri="{91240B29-F687-4f45-9708-019B960494DF}">
-                  <a14:hiddenLine xmlns="" xmlns:a14="http://schemas.microsoft.com/office/drawing/2010/main" w="9525">
+                  <a14:hiddenLine xmlns:a14="http://schemas.microsoft.com/office/drawing/2010/main" xmlns="" w="9525">
                     <a:solidFill>
                       <a:srgbClr val="000000"/>
                     </a:solidFill>
@@ -13022,7 +13022,7 @@
           <a:p>
             <a:fld id="{F34B6E3E-06F4-4326-ABDB-61EE022A2F5F}" type="datetimeFigureOut">
               <a:rPr lang="en-US" smtClean="0"/>
-              <a:t>7/28/2020</a:t>
+              <a:t>7/29/2020</a:t>
             </a:fld>
             <a:endParaRPr lang="en-US"/>
           </a:p>
@@ -16193,7 +16193,7 @@
             </a:pPr>
             <a:r>
               <a:rPr lang="en-US" sz="2800" dirty="0"/>
-              <a:t>Why indexing is a developer’s task</a:t>
+              <a:t>Why Indexing is a Developer’s Task</a:t>
             </a:r>
           </a:p>
           <a:p>
@@ -16204,7 +16204,7 @@
             </a:pPr>
             <a:r>
               <a:rPr lang="en-US" sz="2800" dirty="0"/>
-              <a:t>Anatomy of a non-clustered index</a:t>
+              <a:t>Anatomy of an Index</a:t>
             </a:r>
           </a:p>
           <a:p>
@@ -16238,7 +16238,7 @@
             </a:pPr>
             <a:r>
               <a:rPr lang="en-US" sz="2800" dirty="0"/>
-              <a:t>Execution plans</a:t>
+              <a:t>Execution Plans</a:t>
             </a:r>
           </a:p>
           <a:p>
@@ -16249,8 +16249,21 @@
             </a:pPr>
             <a:r>
               <a:rPr lang="en-US" sz="2800" dirty="0"/>
-              <a:t>The WHERE clause and common pitfalls</a:t>
-            </a:r>
+              <a:t>The </a:t>
+            </a:r>
+            <a:r>
+              <a:rPr lang="en-US" sz="2800"/>
+              <a:t>WHERE Clause and Common </a:t>
+            </a:r>
+            <a:r>
+              <a:rPr lang="en-US" sz="2800" dirty="0"/>
+              <a:t>P</a:t>
+            </a:r>
+            <a:r>
+              <a:rPr lang="en-US" sz="2800"/>
+              <a:t>itfalls</a:t>
+            </a:r>
+            <a:endParaRPr lang="en-US" sz="2800" dirty="0"/>
           </a:p>
         </p:txBody>
       </p:sp>

</xml_diff>